<commit_message>
fix headers in index.html
</commit_message>
<xml_diff>
--- a/docs/lectures/03-Twoway1.pptx
+++ b/docs/lectures/03-Twoway1.pptx
@@ -431,7 +431,7 @@
           <a:p>
             <a:fld id="{08BD4FA9-F3CE-45B3-A980-C331C6F1EF65}" type="datetimeFigureOut">
               <a:rPr lang="en-US" smtClean="0"/>
-              <a:t>1/24/2023</a:t>
+              <a:t>1/31/2023</a:t>
             </a:fld>
             <a:endParaRPr lang="en-US"/>
           </a:p>
@@ -596,7 +596,7 @@
           <a:p>
             <a:fld id="{B1271872-C532-4BFE-903F-C7072979174B}" type="datetimeFigureOut">
               <a:rPr lang="en-US" smtClean="0"/>
-              <a:t>1/24/2023</a:t>
+              <a:t>1/31/2023</a:t>
             </a:fld>
             <a:endParaRPr lang="en-US"/>
           </a:p>
@@ -1326,7 +1326,7 @@
           <a:p>
             <a:fld id="{EAAD3657-2200-4D14-82C0-10C39B0F0F06}" type="datetime1">
               <a:rPr lang="en-US" smtClean="0"/>
-              <a:t>1/24/2023</a:t>
+              <a:t>1/31/2023</a:t>
             </a:fld>
             <a:endParaRPr lang="en-US"/>
           </a:p>
@@ -1494,7 +1494,7 @@
           <a:p>
             <a:fld id="{11BBAF55-A85E-4993-914E-FC1E5AA7DF24}" type="datetime1">
               <a:rPr lang="en-US" smtClean="0"/>
-              <a:t>1/24/2023</a:t>
+              <a:t>1/31/2023</a:t>
             </a:fld>
             <a:endParaRPr lang="en-US"/>
           </a:p>
@@ -1672,7 +1672,7 @@
           <a:p>
             <a:fld id="{39816E07-E1DB-44A4-A5E5-9F4B54E8C933}" type="datetime1">
               <a:rPr lang="en-US" smtClean="0"/>
-              <a:t>1/24/2023</a:t>
+              <a:t>1/31/2023</a:t>
             </a:fld>
             <a:endParaRPr lang="en-US"/>
           </a:p>
@@ -1857,7 +1857,7 @@
           <a:p>
             <a:fld id="{C2B1AD17-B813-4477-8AFE-B1860CC59113}" type="datetime1">
               <a:rPr lang="en-US" smtClean="0"/>
-              <a:t>1/24/2023</a:t>
+              <a:t>1/31/2023</a:t>
             </a:fld>
             <a:endParaRPr lang="en-US"/>
           </a:p>
@@ -2102,7 +2102,7 @@
           <a:p>
             <a:fld id="{D0975C0D-5C9E-48CC-8D31-F42D19FA8F7A}" type="datetime1">
               <a:rPr lang="en-US" smtClean="0"/>
-              <a:t>1/24/2023</a:t>
+              <a:t>1/31/2023</a:t>
             </a:fld>
             <a:endParaRPr lang="en-US"/>
           </a:p>
@@ -2387,7 +2387,7 @@
           <a:p>
             <a:fld id="{28657551-0F2B-4F09-86FD-F7994CE83DC5}" type="datetime1">
               <a:rPr lang="en-US" smtClean="0"/>
-              <a:t>1/24/2023</a:t>
+              <a:t>1/31/2023</a:t>
             </a:fld>
             <a:endParaRPr lang="en-US"/>
           </a:p>
@@ -2806,7 +2806,7 @@
           <a:p>
             <a:fld id="{3929D2B2-4200-46B9-96C3-02A55D5FAA00}" type="datetime1">
               <a:rPr lang="en-US" smtClean="0"/>
-              <a:t>1/24/2023</a:t>
+              <a:t>1/31/2023</a:t>
             </a:fld>
             <a:endParaRPr lang="en-US"/>
           </a:p>
@@ -2923,7 +2923,7 @@
           <a:p>
             <a:fld id="{41FF7722-74E8-497F-A072-89677A2C2373}" type="datetime1">
               <a:rPr lang="en-US" smtClean="0"/>
-              <a:t>1/24/2023</a:t>
+              <a:t>1/31/2023</a:t>
             </a:fld>
             <a:endParaRPr lang="en-US"/>
           </a:p>
@@ -3018,7 +3018,7 @@
           <a:p>
             <a:fld id="{BD26212E-B46B-426F-AE59-AA326827D9E0}" type="datetime1">
               <a:rPr lang="en-US" smtClean="0"/>
-              <a:t>1/24/2023</a:t>
+              <a:t>1/31/2023</a:t>
             </a:fld>
             <a:endParaRPr lang="en-US"/>
           </a:p>
@@ -3293,7 +3293,7 @@
           <a:p>
             <a:fld id="{FB9B81E8-09EA-4684-A39F-38DE1E49D20C}" type="datetime1">
               <a:rPr lang="en-US" smtClean="0"/>
-              <a:t>1/24/2023</a:t>
+              <a:t>1/31/2023</a:t>
             </a:fld>
             <a:endParaRPr lang="en-US"/>
           </a:p>
@@ -3545,7 +3545,7 @@
           <a:p>
             <a:fld id="{35C5CC5F-056C-4047-9A5C-9F5B4BED129B}" type="datetime1">
               <a:rPr lang="en-US" smtClean="0"/>
-              <a:t>1/24/2023</a:t>
+              <a:t>1/31/2023</a:t>
             </a:fld>
             <a:endParaRPr lang="en-US"/>
           </a:p>
@@ -3759,7 +3759,7 @@
           <a:p>
             <a:fld id="{E8171053-07BD-4A17-AC24-0A22EAA36098}" type="datetime1">
               <a:rPr lang="en-US" smtClean="0"/>
-              <a:t>1/24/2023</a:t>
+              <a:t>1/31/2023</a:t>
             </a:fld>
             <a:endParaRPr lang="en-US"/>
           </a:p>
@@ -27604,7 +27604,7 @@
         </p:blipFill>
         <p:spPr>
           <a:xfrm>
-            <a:off x="457200" y="1411570"/>
+            <a:off x="457200" y="1219200"/>
             <a:ext cx="8171428" cy="4523809"/>
           </a:xfrm>
           <a:prstGeom prst="rect">
@@ -27612,6 +27612,41 @@
           </a:prstGeom>
         </p:spPr>
       </p:pic>
+      <p:sp>
+        <p:nvSpPr>
+          <p:cNvPr id="4" name="TextBox 3">
+            <a:extLst>
+              <a:ext uri="{FF2B5EF4-FFF2-40B4-BE49-F238E27FC236}">
+                <a16:creationId xmlns:a16="http://schemas.microsoft.com/office/drawing/2014/main" id="{C6C24D97-A3E7-34BF-0515-3B577FA54BCF}"/>
+              </a:ext>
+            </a:extLst>
+          </p:cNvPr>
+          <p:cNvSpPr txBox="1"/>
+          <p:nvPr/>
+        </p:nvSpPr>
+        <p:spPr>
+          <a:xfrm>
+            <a:off x="457200" y="5791200"/>
+            <a:ext cx="7696200" cy="461665"/>
+          </a:xfrm>
+          <a:prstGeom prst="rect">
+            <a:avLst/>
+          </a:prstGeom>
+          <a:noFill/>
+        </p:spPr>
+        <p:txBody>
+          <a:bodyPr wrap="square" rtlCol="0">
+            <a:spAutoFit/>
+          </a:bodyPr>
+          <a:lstStyle/>
+          <a:p>
+            <a:r>
+              <a:rPr lang="en-CA" sz="2400" dirty="0"/>
+              <a:t>Q: What would perfect agreement look like?</a:t>
+            </a:r>
+          </a:p>
+        </p:txBody>
+      </p:sp>
     </p:spTree>
     <p:extLst>
       <p:ext uri="{BB962C8B-B14F-4D97-AF65-F5344CB8AC3E}">
@@ -28476,13 +28511,13 @@
           <a:p>
             <a:r>
               <a:rPr lang="en-CA" dirty="0"/>
-              <a:t>To what extent to the neurologists agree?</a:t>
+              <a:t>Q: To what extent to the neurologists agree?</a:t>
             </a:r>
           </a:p>
           <a:p>
             <a:r>
               <a:rPr lang="en-CA" dirty="0"/>
-              <a:t>Do they agree equally for the patients for the two cities</a:t>
+              <a:t>Q: Do they agree equally for the patients for the two cities</a:t>
             </a:r>
           </a:p>
         </p:txBody>
@@ -30018,7 +30053,7 @@
           <a:p>
             <a:r>
               <a:rPr lang="en-US" dirty="0"/>
-              <a:t>The smallest exact agreement occurs for “very often”, but husbands &amp; wives more on this allowing </a:t>
+              <a:t>The smallest exact agreement occurs for “very often”, but husbands &amp; wives agree more on this allowing </a:t>
             </a:r>
             <a:r>
               <a:rPr lang="en-US" dirty="0">
@@ -30888,8 +30923,16 @@
           <a:lstStyle/>
           <a:p>
             <a:r>
+              <a:rPr lang="en-CA" sz="2400" dirty="0">
+                <a:solidFill>
+                  <a:srgbClr val="0070C0"/>
+                </a:solidFill>
+              </a:rPr>
+              <a:t>Multiple</a:t>
+            </a:r>
+            <a:r>
               <a:rPr lang="en-CA" sz="2400" dirty="0"/>
-              <a:t>Multiple correspondence analysis  extends this to 3+ way tables</a:t>
+              <a:t> correspondence analysis  extends this to 3+ way tables</a:t>
             </a:r>
           </a:p>
           <a:p>

</xml_diff>